<commit_message>
[#7] AWS SDK: S3와 Personalize (#8)
* [#7] add README.md

* [#7] implementing personalize infra script.

* [#7] create and remove resources.

* [#7] succeeded to import dataset.

* [#7] succeeded to get recommendations.

TODO: refactor to use Jupyter notebook.

* [#7] add batch inference job.

* [#7] update architecture.

* [#7] Complete to write setup/destroy script.

* [#7] ignore .vscode

* [#7] Update README.md

* [#7] shuffle title names.

* [#7] fix comment.
</commit_message>
<xml_diff>
--- a/diagram/architecture.pptx
+++ b/diagram/architecture.pptx
@@ -104,6 +104,11 @@
       </a:defRPr>
     </a:lvl9pPr>
   </p:defaultTextStyle>
+  <p:extLst>
+    <p:ext uri="{EFAFB233-063F-42B5-8137-9DF3F51BA10A}">
+      <p15:sldGuideLst xmlns:p15="http://schemas.microsoft.com/office/powerpoint/2012/main"/>
+    </p:ext>
+  </p:extLst>
 </p:presentation>
 </file>
 
@@ -238,7 +243,7 @@
           <a:p>
             <a:fld id="{3315C6C2-5E3C-0545-A590-A2FEC84CB2E4}" type="datetimeFigureOut">
               <a:rPr lang="en-KR" smtClean="0"/>
-              <a:t>2020/08/15</a:t>
+              <a:t>2020/08/22</a:t>
             </a:fld>
             <a:endParaRPr lang="en-KR"/>
           </a:p>
@@ -408,7 +413,7 @@
           <a:p>
             <a:fld id="{3315C6C2-5E3C-0545-A590-A2FEC84CB2E4}" type="datetimeFigureOut">
               <a:rPr lang="en-KR" smtClean="0"/>
-              <a:t>2020/08/15</a:t>
+              <a:t>2020/08/22</a:t>
             </a:fld>
             <a:endParaRPr lang="en-KR"/>
           </a:p>
@@ -588,7 +593,7 @@
           <a:p>
             <a:fld id="{3315C6C2-5E3C-0545-A590-A2FEC84CB2E4}" type="datetimeFigureOut">
               <a:rPr lang="en-KR" smtClean="0"/>
-              <a:t>2020/08/15</a:t>
+              <a:t>2020/08/22</a:t>
             </a:fld>
             <a:endParaRPr lang="en-KR"/>
           </a:p>
@@ -758,7 +763,7 @@
           <a:p>
             <a:fld id="{3315C6C2-5E3C-0545-A590-A2FEC84CB2E4}" type="datetimeFigureOut">
               <a:rPr lang="en-KR" smtClean="0"/>
-              <a:t>2020/08/15</a:t>
+              <a:t>2020/08/22</a:t>
             </a:fld>
             <a:endParaRPr lang="en-KR"/>
           </a:p>
@@ -1002,7 +1007,7 @@
           <a:p>
             <a:fld id="{3315C6C2-5E3C-0545-A590-A2FEC84CB2E4}" type="datetimeFigureOut">
               <a:rPr lang="en-KR" smtClean="0"/>
-              <a:t>2020/08/15</a:t>
+              <a:t>2020/08/22</a:t>
             </a:fld>
             <a:endParaRPr lang="en-KR"/>
           </a:p>
@@ -1234,7 +1239,7 @@
           <a:p>
             <a:fld id="{3315C6C2-5E3C-0545-A590-A2FEC84CB2E4}" type="datetimeFigureOut">
               <a:rPr lang="en-KR" smtClean="0"/>
-              <a:t>2020/08/15</a:t>
+              <a:t>2020/08/22</a:t>
             </a:fld>
             <a:endParaRPr lang="en-KR"/>
           </a:p>
@@ -1601,7 +1606,7 @@
           <a:p>
             <a:fld id="{3315C6C2-5E3C-0545-A590-A2FEC84CB2E4}" type="datetimeFigureOut">
               <a:rPr lang="en-KR" smtClean="0"/>
-              <a:t>2020/08/15</a:t>
+              <a:t>2020/08/22</a:t>
             </a:fld>
             <a:endParaRPr lang="en-KR"/>
           </a:p>
@@ -1719,7 +1724,7 @@
           <a:p>
             <a:fld id="{3315C6C2-5E3C-0545-A590-A2FEC84CB2E4}" type="datetimeFigureOut">
               <a:rPr lang="en-KR" smtClean="0"/>
-              <a:t>2020/08/15</a:t>
+              <a:t>2020/08/22</a:t>
             </a:fld>
             <a:endParaRPr lang="en-KR"/>
           </a:p>
@@ -1814,7 +1819,7 @@
           <a:p>
             <a:fld id="{3315C6C2-5E3C-0545-A590-A2FEC84CB2E4}" type="datetimeFigureOut">
               <a:rPr lang="en-KR" smtClean="0"/>
-              <a:t>2020/08/15</a:t>
+              <a:t>2020/08/22</a:t>
             </a:fld>
             <a:endParaRPr lang="en-KR"/>
           </a:p>
@@ -2091,7 +2096,7 @@
           <a:p>
             <a:fld id="{3315C6C2-5E3C-0545-A590-A2FEC84CB2E4}" type="datetimeFigureOut">
               <a:rPr lang="en-KR" smtClean="0"/>
-              <a:t>2020/08/15</a:t>
+              <a:t>2020/08/22</a:t>
             </a:fld>
             <a:endParaRPr lang="en-KR"/>
           </a:p>
@@ -2348,7 +2353,7 @@
           <a:p>
             <a:fld id="{3315C6C2-5E3C-0545-A590-A2FEC84CB2E4}" type="datetimeFigureOut">
               <a:rPr lang="en-KR" smtClean="0"/>
-              <a:t>2020/08/15</a:t>
+              <a:t>2020/08/22</a:t>
             </a:fld>
             <a:endParaRPr lang="en-KR"/>
           </a:p>
@@ -2561,7 +2566,7 @@
           <a:p>
             <a:fld id="{3315C6C2-5E3C-0545-A590-A2FEC84CB2E4}" type="datetimeFigureOut">
               <a:rPr lang="en-KR" smtClean="0"/>
-              <a:t>2020/08/15</a:t>
+              <a:t>2020/08/22</a:t>
             </a:fld>
             <a:endParaRPr lang="en-KR"/>
           </a:p>
@@ -3742,14 +3747,14 @@
           <p:cNvCxnSpPr>
             <a:cxnSpLocks/>
             <a:stCxn id="82" idx="3"/>
-            <a:endCxn id="67" idx="1"/>
+            <a:endCxn id="55" idx="1"/>
           </p:cNvCxnSpPr>
           <p:nvPr/>
         </p:nvCxnSpPr>
         <p:spPr>
           <a:xfrm>
             <a:off x="4432344" y="7477170"/>
-            <a:ext cx="3286624" cy="8118"/>
+            <a:ext cx="1297983" cy="5666"/>
           </a:xfrm>
           <a:prstGeom prst="straightConnector1">
             <a:avLst/>
@@ -4624,8 +4629,8 @@
         </p:nvSpPr>
         <p:spPr>
           <a:xfrm>
-            <a:off x="8260143" y="7394788"/>
-            <a:ext cx="1595309" cy="430887"/>
+            <a:off x="8235297" y="7094532"/>
+            <a:ext cx="1645002" cy="769441"/>
           </a:xfrm>
           <a:prstGeom prst="rect">
             <a:avLst/>
@@ -4667,11 +4672,56 @@
               </a:rPr>
               <a:t>데이터를 바탕으로 학습</a:t>
             </a:r>
+            <a:r>
+              <a:rPr lang="en-US" altLang="ko-KR" sz="1100" dirty="0">
+                <a:latin typeface="Nanum Gothic" panose="020D0604000000000000" pitchFamily="34" charset="-127"/>
+                <a:ea typeface="Nanum Gothic" panose="020D0604000000000000" pitchFamily="34" charset="-127"/>
+              </a:rPr>
+              <a:t>,</a:t>
+            </a:r>
+          </a:p>
+          <a:p>
+            <a:pPr algn="ctr"/>
+            <a:r>
+              <a:rPr lang="en-US" altLang="ko-KR" sz="1100" dirty="0" err="1">
+                <a:latin typeface="Nanum Gothic" panose="020D0604000000000000" pitchFamily="34" charset="-127"/>
+                <a:ea typeface="Nanum Gothic" panose="020D0604000000000000" pitchFamily="34" charset="-127"/>
+              </a:rPr>
+              <a:t>BatchInferenceJob</a:t>
+            </a:r>
+            <a:r>
+              <a:rPr lang="ko-KR" altLang="en-US" sz="1100" dirty="0" err="1">
+                <a:latin typeface="Nanum Gothic" panose="020D0604000000000000" pitchFamily="34" charset="-127"/>
+                <a:ea typeface="Nanum Gothic" panose="020D0604000000000000" pitchFamily="34" charset="-127"/>
+              </a:rPr>
+              <a:t>으로</a:t>
+            </a:r>
             <a:endParaRPr lang="en-US" altLang="ko-KR" sz="1100" dirty="0">
               <a:latin typeface="Nanum Gothic" panose="020D0604000000000000" pitchFamily="34" charset="-127"/>
               <a:ea typeface="Nanum Gothic" panose="020D0604000000000000" pitchFamily="34" charset="-127"/>
             </a:endParaRPr>
           </a:p>
+          <a:p>
+            <a:pPr algn="ctr"/>
+            <a:r>
+              <a:rPr lang="en-US" altLang="ko-KR" sz="1100" dirty="0">
+                <a:latin typeface="Nanum Gothic" panose="020D0604000000000000" pitchFamily="34" charset="-127"/>
+                <a:ea typeface="Nanum Gothic" panose="020D0604000000000000" pitchFamily="34" charset="-127"/>
+              </a:rPr>
+              <a:t>S3</a:t>
+            </a:r>
+            <a:r>
+              <a:rPr lang="ko-KR" altLang="en-US" sz="1100" dirty="0">
+                <a:latin typeface="Nanum Gothic" panose="020D0604000000000000" pitchFamily="34" charset="-127"/>
+                <a:ea typeface="Nanum Gothic" panose="020D0604000000000000" pitchFamily="34" charset="-127"/>
+              </a:rPr>
+              <a:t>에 추천 데이터 저장</a:t>
+            </a:r>
+            <a:endParaRPr lang="en-US" altLang="ko-KR" sz="1100" dirty="0">
+              <a:latin typeface="Nanum Gothic" panose="020D0604000000000000" pitchFamily="34" charset="-127"/>
+              <a:ea typeface="Nanum Gothic" panose="020D0604000000000000" pitchFamily="34" charset="-127"/>
+            </a:endParaRPr>
+          </a:p>
         </p:txBody>
       </p:sp>
       <p:sp>
@@ -4851,7 +4901,7 @@
         </p:nvSpPr>
         <p:spPr>
           <a:xfrm>
-            <a:off x="5257507" y="7602019"/>
+            <a:off x="4506877" y="7520131"/>
             <a:ext cx="1236236" cy="261610"/>
           </a:xfrm>
           <a:prstGeom prst="rect">
@@ -5589,6 +5639,171 @@
                 <a:ea typeface="Nanum Gothic" panose="020D0604000000000000" pitchFamily="34" charset="-127"/>
               </a:rPr>
               <a:t>발송</a:t>
+            </a:r>
+            <a:endParaRPr lang="en-KR" sz="1100" dirty="0">
+              <a:latin typeface="Nanum Gothic" panose="020D0604000000000000" pitchFamily="34" charset="-127"/>
+              <a:ea typeface="Nanum Gothic" panose="020D0604000000000000" pitchFamily="34" charset="-127"/>
+            </a:endParaRPr>
+          </a:p>
+        </p:txBody>
+      </p:sp>
+      <p:pic>
+        <p:nvPicPr>
+          <p:cNvPr id="55" name="Graphic 54">
+            <a:extLst>
+              <a:ext uri="{FF2B5EF4-FFF2-40B4-BE49-F238E27FC236}">
+                <a16:creationId xmlns:a16="http://schemas.microsoft.com/office/drawing/2014/main" id="{232F84D8-5168-DE4B-A7FC-7C87B100FFB5}"/>
+              </a:ext>
+            </a:extLst>
+          </p:cNvPr>
+          <p:cNvPicPr>
+            <a:picLocks noChangeAspect="1"/>
+          </p:cNvPicPr>
+          <p:nvPr/>
+        </p:nvPicPr>
+        <p:blipFill>
+          <a:blip r:embed="rId10">
+            <a:extLst>
+              <a:ext uri="{96DAC541-7B7A-43D3-8B79-37D633B846F1}">
+                <asvg:svgBlip xmlns:asvg="http://schemas.microsoft.com/office/drawing/2016/SVG/main" r:embed="rId11"/>
+              </a:ext>
+            </a:extLst>
+          </a:blip>
+          <a:stretch>
+            <a:fillRect/>
+          </a:stretch>
+        </p:blipFill>
+        <p:spPr>
+          <a:xfrm>
+            <a:off x="5730327" y="7247886"/>
+            <a:ext cx="469900" cy="469900"/>
+          </a:xfrm>
+          <a:prstGeom prst="rect">
+            <a:avLst/>
+          </a:prstGeom>
+        </p:spPr>
+      </p:pic>
+      <p:sp>
+        <p:nvSpPr>
+          <p:cNvPr id="56" name="TextBox 55">
+            <a:extLst>
+              <a:ext uri="{FF2B5EF4-FFF2-40B4-BE49-F238E27FC236}">
+                <a16:creationId xmlns:a16="http://schemas.microsoft.com/office/drawing/2014/main" id="{FB1D9A3A-01FC-6342-849A-6F09F4B51F27}"/>
+              </a:ext>
+            </a:extLst>
+          </p:cNvPr>
+          <p:cNvSpPr txBox="1"/>
+          <p:nvPr/>
+        </p:nvSpPr>
+        <p:spPr>
+          <a:xfrm>
+            <a:off x="4797855" y="7847879"/>
+            <a:ext cx="2301904" cy="523220"/>
+          </a:xfrm>
+          <a:prstGeom prst="rect">
+            <a:avLst/>
+          </a:prstGeom>
+          <a:noFill/>
+        </p:spPr>
+        <p:txBody>
+          <a:bodyPr wrap="square" rtlCol="0">
+            <a:spAutoFit/>
+          </a:bodyPr>
+          <a:lstStyle/>
+          <a:p>
+            <a:pPr algn="ctr"/>
+            <a:r>
+              <a:rPr lang="en-US" sz="1400" dirty="0">
+                <a:latin typeface="Nanum Gothic" panose="020D0604000000000000" pitchFamily="34" charset="-127"/>
+                <a:ea typeface="Nanum Gothic" panose="020D0604000000000000" pitchFamily="34" charset="-127"/>
+              </a:rPr>
+              <a:t>Amazon Simple Storage Service</a:t>
+            </a:r>
+          </a:p>
+        </p:txBody>
+      </p:sp>
+      <p:cxnSp>
+        <p:nvCxnSpPr>
+          <p:cNvPr id="57" name="Straight Arrow Connector 56">
+            <a:extLst>
+              <a:ext uri="{FF2B5EF4-FFF2-40B4-BE49-F238E27FC236}">
+                <a16:creationId xmlns:a16="http://schemas.microsoft.com/office/drawing/2014/main" id="{0023D4E3-DC11-1346-9B89-D6A3AF13FAFD}"/>
+              </a:ext>
+            </a:extLst>
+          </p:cNvPr>
+          <p:cNvCxnSpPr>
+            <a:cxnSpLocks/>
+            <a:stCxn id="55" idx="3"/>
+            <a:endCxn id="67" idx="1"/>
+          </p:cNvCxnSpPr>
+          <p:nvPr/>
+        </p:nvCxnSpPr>
+        <p:spPr>
+          <a:xfrm>
+            <a:off x="6200227" y="7482836"/>
+            <a:ext cx="1518741" cy="2452"/>
+          </a:xfrm>
+          <a:prstGeom prst="straightConnector1">
+            <a:avLst/>
+          </a:prstGeom>
+          <a:ln w="12700">
+            <a:solidFill>
+              <a:srgbClr val="545B64"/>
+            </a:solidFill>
+            <a:headEnd type="arrow" w="med" len="sm"/>
+            <a:tailEnd type="none" w="med" len="sm"/>
+          </a:ln>
+        </p:spPr>
+        <p:style>
+          <a:lnRef idx="1">
+            <a:schemeClr val="accent1"/>
+          </a:lnRef>
+          <a:fillRef idx="0">
+            <a:schemeClr val="accent1"/>
+          </a:fillRef>
+          <a:effectRef idx="0">
+            <a:schemeClr val="accent1"/>
+          </a:effectRef>
+          <a:fontRef idx="minor">
+            <a:schemeClr val="tx1"/>
+          </a:fontRef>
+        </p:style>
+      </p:cxnSp>
+      <p:sp>
+        <p:nvSpPr>
+          <p:cNvPr id="60" name="TextBox 59">
+            <a:extLst>
+              <a:ext uri="{FF2B5EF4-FFF2-40B4-BE49-F238E27FC236}">
+                <a16:creationId xmlns:a16="http://schemas.microsoft.com/office/drawing/2014/main" id="{C54C3810-14BB-4F49-9002-D6FD6023B6D1}"/>
+              </a:ext>
+            </a:extLst>
+          </p:cNvPr>
+          <p:cNvSpPr txBox="1"/>
+          <p:nvPr/>
+        </p:nvSpPr>
+        <p:spPr>
+          <a:xfrm>
+            <a:off x="6363879" y="7512018"/>
+            <a:ext cx="1236236" cy="261610"/>
+          </a:xfrm>
+          <a:prstGeom prst="rect">
+            <a:avLst/>
+          </a:prstGeom>
+          <a:noFill/>
+        </p:spPr>
+        <p:txBody>
+          <a:bodyPr wrap="none" rtlCol="0">
+            <a:spAutoFit/>
+          </a:bodyPr>
+          <a:lstStyle/>
+          <a:p>
+            <a:pPr algn="ctr"/>
+            <a:r>
+              <a:rPr lang="ko-KR" altLang="en-US" sz="1100" dirty="0">
+                <a:latin typeface="Nanum Gothic" panose="020D0604000000000000" pitchFamily="34" charset="-127"/>
+                <a:ea typeface="Nanum Gothic" panose="020D0604000000000000" pitchFamily="34" charset="-127"/>
+              </a:rPr>
+              <a:t>작품 추천 데이터</a:t>
             </a:r>
             <a:endParaRPr lang="en-KR" sz="1100" dirty="0">
               <a:latin typeface="Nanum Gothic" panose="020D0604000000000000" pitchFamily="34" charset="-127"/>

</xml_diff>